<commit_message>
New materials for semester 2 2021-2022
</commit_message>
<xml_diff>
--- a/BOQC-Basis of Quantum computing/0. Basic math.pptx
+++ b/BOQC-Basis of Quantum computing/0. Basic math.pptx
@@ -5,7 +5,7 @@
     <p:sldMasterId id="2147483648" r:id="rId1"/>
   </p:sldMasterIdLst>
   <p:notesMasterIdLst>
-    <p:notesMasterId r:id="rId34"/>
+    <p:notesMasterId r:id="rId35"/>
   </p:notesMasterIdLst>
   <p:sldIdLst>
     <p:sldId id="256" r:id="rId2"/>
@@ -40,6 +40,7 @@
     <p:sldId id="284" r:id="rId31"/>
     <p:sldId id="285" r:id="rId32"/>
     <p:sldId id="286" r:id="rId33"/>
+    <p:sldId id="288" r:id="rId34"/>
   </p:sldIdLst>
   <p:sldSz cx="12192000" cy="6858000"/>
   <p:notesSz cx="6858000" cy="9144000"/>
@@ -228,7 +229,7 @@
           <a:p>
             <a:fld id="{BF7226A7-5670-4E33-BDB8-C41537D25060}" type="datetimeFigureOut">
               <a:rPr lang="vi-VN" smtClean="0"/>
-              <a:t>25/11/2021</a:t>
+              <a:t>26/11/2021</a:t>
             </a:fld>
             <a:endParaRPr lang="vi-VN"/>
           </a:p>
@@ -733,7 +734,7 @@
           <a:p>
             <a:fld id="{A015C75D-4FEA-45E7-93A1-FAAF79A76D77}" type="datetime1">
               <a:rPr lang="vi-VN" smtClean="0"/>
-              <a:t>25/11/2021</a:t>
+              <a:t>26/11/2021</a:t>
             </a:fld>
             <a:endParaRPr lang="vi-VN"/>
           </a:p>
@@ -931,7 +932,7 @@
           <a:p>
             <a:fld id="{5B134A02-4881-4DD1-B683-8C5B7DF23EAB}" type="datetime1">
               <a:rPr lang="vi-VN" smtClean="0"/>
-              <a:t>25/11/2021</a:t>
+              <a:t>26/11/2021</a:t>
             </a:fld>
             <a:endParaRPr lang="vi-VN"/>
           </a:p>
@@ -1139,7 +1140,7 @@
           <a:p>
             <a:fld id="{79BF513D-02BD-42E1-A3BB-BBA92D968E71}" type="datetime1">
               <a:rPr lang="vi-VN" smtClean="0"/>
-              <a:t>25/11/2021</a:t>
+              <a:t>26/11/2021</a:t>
             </a:fld>
             <a:endParaRPr lang="vi-VN"/>
           </a:p>
@@ -1337,7 +1338,7 @@
           <a:p>
             <a:fld id="{BC14C8B4-E2CF-42F4-9553-DBCBA282C932}" type="datetime1">
               <a:rPr lang="vi-VN" smtClean="0"/>
-              <a:t>25/11/2021</a:t>
+              <a:t>26/11/2021</a:t>
             </a:fld>
             <a:endParaRPr lang="vi-VN"/>
           </a:p>
@@ -1612,7 +1613,7 @@
           <a:p>
             <a:fld id="{B578E9D8-472C-4C1F-A304-29EDDA8E7801}" type="datetime1">
               <a:rPr lang="vi-VN" smtClean="0"/>
-              <a:t>25/11/2021</a:t>
+              <a:t>26/11/2021</a:t>
             </a:fld>
             <a:endParaRPr lang="vi-VN"/>
           </a:p>
@@ -1877,7 +1878,7 @@
           <a:p>
             <a:fld id="{0DC1156C-C915-40B0-99E7-725153F17CB8}" type="datetime1">
               <a:rPr lang="vi-VN" smtClean="0"/>
-              <a:t>25/11/2021</a:t>
+              <a:t>26/11/2021</a:t>
             </a:fld>
             <a:endParaRPr lang="vi-VN"/>
           </a:p>
@@ -2289,7 +2290,7 @@
           <a:p>
             <a:fld id="{E3BF269C-9302-462A-A29D-B1726E2FF2B3}" type="datetime1">
               <a:rPr lang="vi-VN" smtClean="0"/>
-              <a:t>25/11/2021</a:t>
+              <a:t>26/11/2021</a:t>
             </a:fld>
             <a:endParaRPr lang="vi-VN"/>
           </a:p>
@@ -2430,7 +2431,7 @@
           <a:p>
             <a:fld id="{87502E64-9B66-4E9C-8177-B105D4A4CA21}" type="datetime1">
               <a:rPr lang="vi-VN" smtClean="0"/>
-              <a:t>25/11/2021</a:t>
+              <a:t>26/11/2021</a:t>
             </a:fld>
             <a:endParaRPr lang="vi-VN"/>
           </a:p>
@@ -2543,7 +2544,7 @@
           <a:p>
             <a:fld id="{31BE5C93-7BDE-4B7B-B36B-4C7750B9EB7E}" type="datetime1">
               <a:rPr lang="vi-VN" smtClean="0"/>
-              <a:t>25/11/2021</a:t>
+              <a:t>26/11/2021</a:t>
             </a:fld>
             <a:endParaRPr lang="vi-VN"/>
           </a:p>
@@ -2854,7 +2855,7 @@
           <a:p>
             <a:fld id="{43CD0C27-6F58-4C86-98ED-7429D1160C8C}" type="datetime1">
               <a:rPr lang="vi-VN" smtClean="0"/>
-              <a:t>25/11/2021</a:t>
+              <a:t>26/11/2021</a:t>
             </a:fld>
             <a:endParaRPr lang="vi-VN"/>
           </a:p>
@@ -3142,7 +3143,7 @@
           <a:p>
             <a:fld id="{7805ADDE-E531-4964-B9E6-E565AD4526BC}" type="datetime1">
               <a:rPr lang="vi-VN" smtClean="0"/>
-              <a:t>25/11/2021</a:t>
+              <a:t>26/11/2021</a:t>
             </a:fld>
             <a:endParaRPr lang="vi-VN"/>
           </a:p>
@@ -3383,7 +3384,7 @@
           <a:p>
             <a:fld id="{15ADB5C7-DDB5-4B1E-8296-AE1CA4EE8D37}" type="datetime1">
               <a:rPr lang="vi-VN" smtClean="0"/>
-              <a:t>25/11/2021</a:t>
+              <a:t>26/11/2021</a:t>
             </a:fld>
             <a:endParaRPr lang="vi-VN"/>
           </a:p>
@@ -7610,7 +7611,13 @@
                       <a:rPr lang="en-US" b="0" i="1" smtClean="0">
                         <a:latin typeface="Cambria Math" panose="02040503050406030204" pitchFamily="18" charset="0"/>
                       </a:rPr>
-                      <m:t>=1</m:t>
+                      <m:t>=</m:t>
+                    </m:r>
+                    <m:r>
+                      <a:rPr lang="en-US" b="0" i="1" smtClean="0">
+                        <a:latin typeface="Cambria Math" panose="02040503050406030204" pitchFamily="18" charset="0"/>
+                      </a:rPr>
+                      <m:t>1</m:t>
                     </m:r>
                   </m:oMath>
                 </a14:m>
@@ -18039,8 +18046,8 @@
           </a:p>
         </p:txBody>
       </p:sp>
-      <mc:AlternateContent xmlns:mc="http://schemas.openxmlformats.org/markup-compatibility/2006">
-        <mc:Choice xmlns:a14="http://schemas.microsoft.com/office/drawing/2010/main" Requires="a14">
+      <mc:AlternateContent xmlns:mc="http://schemas.openxmlformats.org/markup-compatibility/2006" xmlns:a14="http://schemas.microsoft.com/office/drawing/2010/main">
+        <mc:Choice Requires="a14">
           <p:sp>
             <p:nvSpPr>
               <p:cNvPr id="3" name="Chỗ dành sẵn cho Nội dung 2">
@@ -18560,7 +18567,13 @@
                             <a:rPr lang="en-US" b="0" i="1" smtClean="0">
                               <a:latin typeface="Cambria Math" panose="02040503050406030204" pitchFamily="18" charset="0"/>
                             </a:rPr>
-                            <m:t>𝑖𝑗</m:t>
+                            <m:t>𝑖</m:t>
+                          </m:r>
+                          <m:r>
+                            <a:rPr lang="en-US" b="0" i="1" smtClean="0">
+                              <a:latin typeface="Cambria Math" panose="02040503050406030204" pitchFamily="18" charset="0"/>
+                            </a:rPr>
+                            <m:t>𝑗</m:t>
                           </m:r>
                         </m:sub>
                         <m:sup/>
@@ -18643,13 +18656,7 @@
                             <a:rPr lang="en-US" i="1">
                               <a:latin typeface="Cambria Math" panose="02040503050406030204" pitchFamily="18" charset="0"/>
                             </a:rPr>
-                            <m:t>⟩</m:t>
-                          </m:r>
-                          <m:r>
-                            <a:rPr lang="en-US" i="1">
-                              <a:latin typeface="Cambria Math" panose="02040503050406030204" pitchFamily="18" charset="0"/>
-                            </a:rPr>
-                            <m:t>⟨</m:t>
+                            <m:t>⟩⟨</m:t>
                           </m:r>
                           <m:sSub>
                             <m:sSubPr>
@@ -18723,7 +18730,7 @@
             </p:txBody>
           </p:sp>
         </mc:Choice>
-        <mc:Fallback>
+        <mc:Fallback xmlns="">
           <p:sp>
             <p:nvSpPr>
               <p:cNvPr id="3" name="Chỗ dành sẵn cho Nội dung 2">
@@ -18831,8 +18838,8 @@
           </a:fontRef>
         </p:style>
       </p:cxnSp>
-      <mc:AlternateContent xmlns:mc="http://schemas.openxmlformats.org/markup-compatibility/2006">
-        <mc:Choice xmlns:a14="http://schemas.microsoft.com/office/drawing/2010/main" Requires="a14">
+      <mc:AlternateContent xmlns:mc="http://schemas.openxmlformats.org/markup-compatibility/2006" xmlns:a14="http://schemas.microsoft.com/office/drawing/2010/main">
+        <mc:Choice Requires="a14">
           <p:sp>
             <p:nvSpPr>
               <p:cNvPr id="7" name="Hộp Văn bản 6">
@@ -18861,6 +18868,7 @@
               </a:bodyPr>
               <a:lstStyle/>
               <a:p>
+                <a:pPr/>
                 <a14:m>
                   <m:oMathPara xmlns:m="http://schemas.openxmlformats.org/officeDocument/2006/math">
                     <m:oMathParaPr>
@@ -18900,7 +18908,7 @@
             </p:txBody>
           </p:sp>
         </mc:Choice>
-        <mc:Fallback>
+        <mc:Fallback xmlns="">
           <p:sp>
             <p:nvSpPr>
               <p:cNvPr id="7" name="Hộp Văn bản 6">
@@ -19004,8 +19012,8 @@
           </a:p>
         </p:txBody>
       </p:sp>
-      <mc:AlternateContent xmlns:mc="http://schemas.openxmlformats.org/markup-compatibility/2006">
-        <mc:Choice xmlns:a14="http://schemas.microsoft.com/office/drawing/2010/main" Requires="a14">
+      <mc:AlternateContent xmlns:mc="http://schemas.openxmlformats.org/markup-compatibility/2006" xmlns:a14="http://schemas.microsoft.com/office/drawing/2010/main">
+        <mc:Choice Requires="a14">
           <p:sp>
             <p:nvSpPr>
               <p:cNvPr id="3" name="Chỗ dành sẵn cho Nội dung 2">
@@ -19714,7 +19722,7 @@
             </p:txBody>
           </p:sp>
         </mc:Choice>
-        <mc:Fallback>
+        <mc:Fallback xmlns="">
           <p:sp>
             <p:nvSpPr>
               <p:cNvPr id="3" name="Chỗ dành sẵn cho Nội dung 2">
@@ -19842,8 +19850,8 @@
           </a:p>
         </p:txBody>
       </p:sp>
-      <mc:AlternateContent xmlns:mc="http://schemas.openxmlformats.org/markup-compatibility/2006">
-        <mc:Choice xmlns:a14="http://schemas.microsoft.com/office/drawing/2010/main" Requires="a14">
+      <mc:AlternateContent xmlns:mc="http://schemas.openxmlformats.org/markup-compatibility/2006" xmlns:a14="http://schemas.microsoft.com/office/drawing/2010/main">
+        <mc:Choice Requires="a14">
           <p:sp>
             <p:nvSpPr>
               <p:cNvPr id="3" name="Chỗ dành sẵn cho Nội dung 2">
@@ -20420,13 +20428,7 @@
                       <a:rPr lang="en-US" i="1">
                         <a:latin typeface="Cambria Math" panose="02040503050406030204" pitchFamily="18" charset="0"/>
                       </a:rPr>
-                      <m:t>⟩</m:t>
-                    </m:r>
-                    <m:r>
-                      <a:rPr lang="en-US" i="1">
-                        <a:latin typeface="Cambria Math" panose="02040503050406030204" pitchFamily="18" charset="0"/>
-                      </a:rPr>
-                      <m:t>=</m:t>
+                      <m:t>⟩=</m:t>
                     </m:r>
                     <m:r>
                       <a:rPr lang="en-US" b="0" i="1" smtClean="0">
@@ -20631,7 +20633,7 @@
             </p:txBody>
           </p:sp>
         </mc:Choice>
-        <mc:Fallback>
+        <mc:Fallback xmlns="">
           <p:sp>
             <p:nvSpPr>
               <p:cNvPr id="3" name="Chỗ dành sẵn cho Nội dung 2">
@@ -20759,8 +20761,8 @@
           </a:p>
         </p:txBody>
       </p:sp>
-      <mc:AlternateContent xmlns:mc="http://schemas.openxmlformats.org/markup-compatibility/2006">
-        <mc:Choice xmlns:a14="http://schemas.microsoft.com/office/drawing/2010/main" Requires="a14">
+      <mc:AlternateContent xmlns:mc="http://schemas.openxmlformats.org/markup-compatibility/2006" xmlns:a14="http://schemas.microsoft.com/office/drawing/2010/main">
+        <mc:Choice Requires="a14">
           <p:sp>
             <p:nvSpPr>
               <p:cNvPr id="3" name="Chỗ dành sẵn cho Nội dung 2">
@@ -21452,7 +21454,7 @@
             </p:txBody>
           </p:sp>
         </mc:Choice>
-        <mc:Fallback>
+        <mc:Fallback xmlns="">
           <p:sp>
             <p:nvSpPr>
               <p:cNvPr id="3" name="Chỗ dành sẵn cho Nội dung 2">
@@ -21580,8 +21582,8 @@
           </a:p>
         </p:txBody>
       </p:sp>
-      <mc:AlternateContent xmlns:mc="http://schemas.openxmlformats.org/markup-compatibility/2006">
-        <mc:Choice xmlns:a14="http://schemas.microsoft.com/office/drawing/2010/main" Requires="a14">
+      <mc:AlternateContent xmlns:mc="http://schemas.openxmlformats.org/markup-compatibility/2006" xmlns:a14="http://schemas.microsoft.com/office/drawing/2010/main">
+        <mc:Choice Requires="a14">
           <p:sp>
             <p:nvSpPr>
               <p:cNvPr id="3" name="Chỗ dành sẵn cho Nội dung 2">
@@ -22492,7 +22494,7 @@
             </p:txBody>
           </p:sp>
         </mc:Choice>
-        <mc:Fallback>
+        <mc:Fallback xmlns="">
           <p:sp>
             <p:nvSpPr>
               <p:cNvPr id="3" name="Chỗ dành sẵn cho Nội dung 2">
@@ -22620,8 +22622,8 @@
           </a:p>
         </p:txBody>
       </p:sp>
-      <mc:AlternateContent xmlns:mc="http://schemas.openxmlformats.org/markup-compatibility/2006">
-        <mc:Choice xmlns:a14="http://schemas.microsoft.com/office/drawing/2010/main" Requires="a14">
+      <mc:AlternateContent xmlns:mc="http://schemas.openxmlformats.org/markup-compatibility/2006" xmlns:a14="http://schemas.microsoft.com/office/drawing/2010/main">
+        <mc:Choice Requires="a14">
           <p:sp>
             <p:nvSpPr>
               <p:cNvPr id="3" name="Chỗ dành sẵn cho Nội dung 2">
@@ -23169,7 +23171,7 @@
             </p:txBody>
           </p:sp>
         </mc:Choice>
-        <mc:Fallback>
+        <mc:Fallback xmlns="">
           <p:sp>
             <p:nvSpPr>
               <p:cNvPr id="3" name="Chỗ dành sẵn cho Nội dung 2">
@@ -23297,8 +23299,8 @@
           </a:p>
         </p:txBody>
       </p:sp>
-      <mc:AlternateContent xmlns:mc="http://schemas.openxmlformats.org/markup-compatibility/2006">
-        <mc:Choice xmlns:a14="http://schemas.microsoft.com/office/drawing/2010/main" Requires="a14">
+      <mc:AlternateContent xmlns:mc="http://schemas.openxmlformats.org/markup-compatibility/2006" xmlns:a14="http://schemas.microsoft.com/office/drawing/2010/main">
+        <mc:Choice Requires="a14">
           <p:sp>
             <p:nvSpPr>
               <p:cNvPr id="3" name="Chỗ dành sẵn cho Nội dung 2">
@@ -23555,7 +23557,19 @@
                       <a:rPr lang="en-US" b="0" i="1" smtClean="0">
                         <a:latin typeface="Cambria Math" panose="02040503050406030204" pitchFamily="18" charset="0"/>
                       </a:rPr>
-                      <m:t>=0:</m:t>
+                      <m:t>=</m:t>
+                    </m:r>
+                    <m:r>
+                      <a:rPr lang="en-US" b="0" i="1" smtClean="0">
+                        <a:latin typeface="Cambria Math" panose="02040503050406030204" pitchFamily="18" charset="0"/>
+                      </a:rPr>
+                      <m:t>0</m:t>
+                    </m:r>
+                    <m:r>
+                      <a:rPr lang="en-US" b="0" i="1" smtClean="0">
+                        <a:latin typeface="Cambria Math" panose="02040503050406030204" pitchFamily="18" charset="0"/>
+                      </a:rPr>
+                      <m:t>:</m:t>
                     </m:r>
                   </m:oMath>
                 </a14:m>
@@ -23685,7 +23699,7 @@
             </p:txBody>
           </p:sp>
         </mc:Choice>
-        <mc:Fallback>
+        <mc:Fallback xmlns="">
           <p:sp>
             <p:nvSpPr>
               <p:cNvPr id="3" name="Chỗ dành sẵn cho Nội dung 2">
@@ -23813,8 +23827,8 @@
           </a:p>
         </p:txBody>
       </p:sp>
-      <mc:AlternateContent xmlns:mc="http://schemas.openxmlformats.org/markup-compatibility/2006">
-        <mc:Choice xmlns:a14="http://schemas.microsoft.com/office/drawing/2010/main" Requires="a14">
+      <mc:AlternateContent xmlns:mc="http://schemas.openxmlformats.org/markup-compatibility/2006" xmlns:a14="http://schemas.microsoft.com/office/drawing/2010/main">
+        <mc:Choice Requires="a14">
           <p:sp>
             <p:nvSpPr>
               <p:cNvPr id="3" name="Chỗ dành sẵn cho Nội dung 2">
@@ -24285,7 +24299,7 @@
             </p:txBody>
           </p:sp>
         </mc:Choice>
-        <mc:Fallback>
+        <mc:Fallback xmlns="">
           <p:sp>
             <p:nvSpPr>
               <p:cNvPr id="3" name="Chỗ dành sẵn cho Nội dung 2">
@@ -25203,8 +25217,8 @@
           </a:p>
         </p:txBody>
       </p:sp>
-      <mc:AlternateContent xmlns:mc="http://schemas.openxmlformats.org/markup-compatibility/2006">
-        <mc:Choice xmlns:a14="http://schemas.microsoft.com/office/drawing/2010/main" Requires="a14">
+      <mc:AlternateContent xmlns:mc="http://schemas.openxmlformats.org/markup-compatibility/2006" xmlns:a14="http://schemas.microsoft.com/office/drawing/2010/main">
+        <mc:Choice Requires="a14">
           <p:sp>
             <p:nvSpPr>
               <p:cNvPr id="3" name="Chỗ dành sẵn cho Nội dung 2">
@@ -25278,7 +25292,7 @@
             </p:txBody>
           </p:sp>
         </mc:Choice>
-        <mc:Fallback>
+        <mc:Fallback xmlns="">
           <p:sp>
             <p:nvSpPr>
               <p:cNvPr id="3" name="Chỗ dành sẵn cho Nội dung 2">
@@ -25406,8 +25420,8 @@
           </a:p>
         </p:txBody>
       </p:sp>
-      <mc:AlternateContent xmlns:mc="http://schemas.openxmlformats.org/markup-compatibility/2006">
-        <mc:Choice xmlns:a14="http://schemas.microsoft.com/office/drawing/2010/main" Requires="a14">
+      <mc:AlternateContent xmlns:mc="http://schemas.openxmlformats.org/markup-compatibility/2006" xmlns:a14="http://schemas.microsoft.com/office/drawing/2010/main">
+        <mc:Choice Requires="a14">
           <p:sp>
             <p:nvSpPr>
               <p:cNvPr id="3" name="Chỗ dành sẵn cho Nội dung 2">
@@ -25563,7 +25577,7 @@
             </p:txBody>
           </p:sp>
         </mc:Choice>
-        <mc:Fallback>
+        <mc:Fallback xmlns="">
           <p:sp>
             <p:nvSpPr>
               <p:cNvPr id="3" name="Chỗ dành sẵn cho Nội dung 2">
@@ -25691,8 +25705,8 @@
           </a:p>
         </p:txBody>
       </p:sp>
-      <mc:AlternateContent xmlns:mc="http://schemas.openxmlformats.org/markup-compatibility/2006">
-        <mc:Choice xmlns:a14="http://schemas.microsoft.com/office/drawing/2010/main" Requires="a14">
+      <mc:AlternateContent xmlns:mc="http://schemas.openxmlformats.org/markup-compatibility/2006" xmlns:a14="http://schemas.microsoft.com/office/drawing/2010/main">
+        <mc:Choice Requires="a14">
           <p:sp>
             <p:nvSpPr>
               <p:cNvPr id="3" name="Chỗ dành sẵn cho Nội dung 2">
@@ -26553,7 +26567,7 @@
             </p:txBody>
           </p:sp>
         </mc:Choice>
-        <mc:Fallback>
+        <mc:Fallback xmlns="">
           <p:sp>
             <p:nvSpPr>
               <p:cNvPr id="3" name="Chỗ dành sẵn cho Nội dung 2">
@@ -26626,6 +26640,782 @@
     <p:extLst>
       <p:ext uri="{BB962C8B-B14F-4D97-AF65-F5344CB8AC3E}">
         <p14:creationId xmlns:p14="http://schemas.microsoft.com/office/powerpoint/2010/main" val="3584913520"/>
+      </p:ext>
+    </p:extLst>
+  </p:cSld>
+  <p:clrMapOvr>
+    <a:masterClrMapping/>
+  </p:clrMapOvr>
+</p:sld>
+</file>
+
+<file path=ppt/slides/slide33.xml><?xml version="1.0" encoding="utf-8"?>
+<p:sld xmlns:a="http://schemas.openxmlformats.org/drawingml/2006/main" xmlns:r="http://schemas.openxmlformats.org/officeDocument/2006/relationships" xmlns:p="http://schemas.openxmlformats.org/presentationml/2006/main">
+  <p:cSld>
+    <p:spTree>
+      <p:nvGrpSpPr>
+        <p:cNvPr id="1" name=""/>
+        <p:cNvGrpSpPr/>
+        <p:nvPr/>
+      </p:nvGrpSpPr>
+      <p:grpSpPr>
+        <a:xfrm>
+          <a:off x="0" y="0"/>
+          <a:ext cx="0" cy="0"/>
+          <a:chOff x="0" y="0"/>
+          <a:chExt cx="0" cy="0"/>
+        </a:xfrm>
+      </p:grpSpPr>
+      <p:sp>
+        <p:nvSpPr>
+          <p:cNvPr id="2" name="Tiêu đề 1">
+            <a:extLst>
+              <a:ext uri="{FF2B5EF4-FFF2-40B4-BE49-F238E27FC236}">
+                <a16:creationId xmlns:a16="http://schemas.microsoft.com/office/drawing/2014/main" id="{8E570911-5CFC-4F0D-BD68-3C535D3D0175}"/>
+              </a:ext>
+            </a:extLst>
+          </p:cNvPr>
+          <p:cNvSpPr>
+            <a:spLocks noGrp="1"/>
+          </p:cNvSpPr>
+          <p:nvPr>
+            <p:ph type="title"/>
+          </p:nvPr>
+        </p:nvSpPr>
+        <p:spPr/>
+        <p:txBody>
+          <a:bodyPr/>
+          <a:lstStyle/>
+          <a:p>
+            <a:r>
+              <a:rPr lang="en-US"/>
+              <a:t>1.6. Adjoint and Hermitian</a:t>
+            </a:r>
+            <a:endParaRPr lang="vi-VN"/>
+          </a:p>
+        </p:txBody>
+      </p:sp>
+      <mc:AlternateContent xmlns:mc="http://schemas.openxmlformats.org/markup-compatibility/2006">
+        <mc:Choice xmlns:a14="http://schemas.microsoft.com/office/drawing/2010/main" Requires="a14">
+          <p:sp>
+            <p:nvSpPr>
+              <p:cNvPr id="3" name="Chỗ dành sẵn cho Nội dung 2">
+                <a:extLst>
+                  <a:ext uri="{FF2B5EF4-FFF2-40B4-BE49-F238E27FC236}">
+                    <a16:creationId xmlns:a16="http://schemas.microsoft.com/office/drawing/2014/main" id="{A65D444E-9B81-4B0B-8F3F-7B73B1202D78}"/>
+                  </a:ext>
+                </a:extLst>
+              </p:cNvPr>
+              <p:cNvSpPr>
+                <a:spLocks noGrp="1"/>
+              </p:cNvSpPr>
+              <p:nvPr>
+                <p:ph idx="1"/>
+              </p:nvPr>
+            </p:nvSpPr>
+            <p:spPr/>
+            <p:txBody>
+              <a:bodyPr/>
+              <a:lstStyle/>
+              <a:p>
+                <a:pPr marL="0" indent="0">
+                  <a:buNone/>
+                </a:pPr>
+                <a14:m>
+                  <m:oMathPara xmlns:m="http://schemas.openxmlformats.org/officeDocument/2006/math">
+                    <m:oMathParaPr>
+                      <m:jc m:val="centerGroup"/>
+                    </m:oMathParaPr>
+                    <m:oMath xmlns:m="http://schemas.openxmlformats.org/officeDocument/2006/math">
+                      <m:d>
+                        <m:dPr>
+                          <m:begChr m:val="|"/>
+                          <m:endChr m:val="⟩"/>
+                          <m:ctrlPr>
+                            <a:rPr lang="en-US" b="0" i="1" smtClean="0">
+                              <a:latin typeface="Cambria Math" panose="02040503050406030204" pitchFamily="18" charset="0"/>
+                            </a:rPr>
+                          </m:ctrlPr>
+                        </m:dPr>
+                        <m:e>
+                          <m:r>
+                            <a:rPr lang="en-US" b="0" i="1" smtClean="0">
+                              <a:latin typeface="Cambria Math" panose="02040503050406030204" pitchFamily="18" charset="0"/>
+                            </a:rPr>
+                            <m:t>𝑣</m:t>
+                          </m:r>
+                        </m:e>
+                      </m:d>
+                      <m:r>
+                        <a:rPr lang="en-US" i="1">
+                          <a:latin typeface="Cambria Math" panose="02040503050406030204" pitchFamily="18" charset="0"/>
+                          <a:ea typeface="Cambria Math" panose="02040503050406030204" pitchFamily="18" charset="0"/>
+                        </a:rPr>
+                        <m:t>≡</m:t>
+                      </m:r>
+                      <m:sSup>
+                        <m:sSupPr>
+                          <m:ctrlPr>
+                            <a:rPr lang="en-US" b="0" i="1" smtClean="0">
+                              <a:latin typeface="Cambria Math" panose="02040503050406030204" pitchFamily="18" charset="0"/>
+                              <a:ea typeface="Cambria Math" panose="02040503050406030204" pitchFamily="18" charset="0"/>
+                            </a:rPr>
+                          </m:ctrlPr>
+                        </m:sSupPr>
+                        <m:e>
+                          <m:d>
+                            <m:dPr>
+                              <m:begChr m:val="⟨"/>
+                              <m:endChr m:val="|"/>
+                              <m:ctrlPr>
+                                <a:rPr lang="en-US" b="0" i="1" smtClean="0">
+                                  <a:latin typeface="Cambria Math" panose="02040503050406030204" pitchFamily="18" charset="0"/>
+                                  <a:ea typeface="Cambria Math" panose="02040503050406030204" pitchFamily="18" charset="0"/>
+                                </a:rPr>
+                              </m:ctrlPr>
+                            </m:dPr>
+                            <m:e>
+                              <m:r>
+                                <a:rPr lang="en-US" b="0" i="1" smtClean="0">
+                                  <a:latin typeface="Cambria Math" panose="02040503050406030204" pitchFamily="18" charset="0"/>
+                                  <a:ea typeface="Cambria Math" panose="02040503050406030204" pitchFamily="18" charset="0"/>
+                                </a:rPr>
+                                <m:t>𝑣</m:t>
+                              </m:r>
+                            </m:e>
+                          </m:d>
+                        </m:e>
+                        <m:sup>
+                          <m:r>
+                            <a:rPr lang="en-US" i="1">
+                              <a:latin typeface="Cambria Math" panose="02040503050406030204" pitchFamily="18" charset="0"/>
+                              <a:ea typeface="Cambria Math" panose="02040503050406030204" pitchFamily="18" charset="0"/>
+                            </a:rPr>
+                            <m:t>†</m:t>
+                          </m:r>
+                        </m:sup>
+                      </m:sSup>
+                    </m:oMath>
+                  </m:oMathPara>
+                </a14:m>
+                <a:endParaRPr lang="en-US" b="0" i="1">
+                  <a:latin typeface="Cambria Math" panose="02040503050406030204" pitchFamily="18" charset="0"/>
+                </a:endParaRPr>
+              </a:p>
+              <a:p>
+                <a:pPr marL="0" indent="0">
+                  <a:buNone/>
+                </a:pPr>
+                <a:endParaRPr lang="en-US" i="1">
+                  <a:latin typeface="Cambria Math" panose="02040503050406030204" pitchFamily="18" charset="0"/>
+                </a:endParaRPr>
+              </a:p>
+              <a:p>
+                <a:pPr marL="0" indent="0">
+                  <a:buNone/>
+                </a:pPr>
+                <a14:m>
+                  <m:oMathPara xmlns:m="http://schemas.openxmlformats.org/officeDocument/2006/math">
+                    <m:oMathParaPr>
+                      <m:jc m:val="centerGroup"/>
+                    </m:oMathParaPr>
+                    <m:oMath xmlns:m="http://schemas.openxmlformats.org/officeDocument/2006/math">
+                      <m:sSup>
+                        <m:sSupPr>
+                          <m:ctrlPr>
+                            <a:rPr lang="en-US" b="0" i="1" smtClean="0">
+                              <a:latin typeface="Cambria Math" panose="02040503050406030204" pitchFamily="18" charset="0"/>
+                            </a:rPr>
+                          </m:ctrlPr>
+                        </m:sSupPr>
+                        <m:e>
+                          <m:d>
+                            <m:dPr>
+                              <m:ctrlPr>
+                                <a:rPr lang="en-US" b="0" i="1" smtClean="0">
+                                  <a:latin typeface="Cambria Math" panose="02040503050406030204" pitchFamily="18" charset="0"/>
+                                </a:rPr>
+                              </m:ctrlPr>
+                            </m:dPr>
+                            <m:e>
+                              <m:r>
+                                <a:rPr lang="en-US" b="0" i="1" smtClean="0">
+                                  <a:latin typeface="Cambria Math" panose="02040503050406030204" pitchFamily="18" charset="0"/>
+                                </a:rPr>
+                                <m:t>𝐴𝐵</m:t>
+                              </m:r>
+                            </m:e>
+                          </m:d>
+                        </m:e>
+                        <m:sup>
+                          <m:r>
+                            <a:rPr lang="en-US" b="0" i="1" smtClean="0">
+                              <a:latin typeface="Cambria Math" panose="02040503050406030204" pitchFamily="18" charset="0"/>
+                              <a:ea typeface="Cambria Math" panose="02040503050406030204" pitchFamily="18" charset="0"/>
+                            </a:rPr>
+                            <m:t>†</m:t>
+                          </m:r>
+                        </m:sup>
+                      </m:sSup>
+                      <m:r>
+                        <a:rPr lang="en-US" b="0" i="1" smtClean="0">
+                          <a:latin typeface="Cambria Math" panose="02040503050406030204" pitchFamily="18" charset="0"/>
+                        </a:rPr>
+                        <m:t>=</m:t>
+                      </m:r>
+                      <m:sSup>
+                        <m:sSupPr>
+                          <m:ctrlPr>
+                            <a:rPr lang="en-US" b="0" i="1" smtClean="0">
+                              <a:latin typeface="Cambria Math" panose="02040503050406030204" pitchFamily="18" charset="0"/>
+                            </a:rPr>
+                          </m:ctrlPr>
+                        </m:sSupPr>
+                        <m:e>
+                          <m:r>
+                            <a:rPr lang="en-US" b="0" i="1" smtClean="0">
+                              <a:latin typeface="Cambria Math" panose="02040503050406030204" pitchFamily="18" charset="0"/>
+                            </a:rPr>
+                            <m:t>𝐵</m:t>
+                          </m:r>
+                        </m:e>
+                        <m:sup>
+                          <m:r>
+                            <a:rPr lang="en-US" i="1">
+                              <a:latin typeface="Cambria Math" panose="02040503050406030204" pitchFamily="18" charset="0"/>
+                              <a:ea typeface="Cambria Math" panose="02040503050406030204" pitchFamily="18" charset="0"/>
+                            </a:rPr>
+                            <m:t>†</m:t>
+                          </m:r>
+                        </m:sup>
+                      </m:sSup>
+                      <m:sSup>
+                        <m:sSupPr>
+                          <m:ctrlPr>
+                            <a:rPr lang="en-US" b="0" i="1" smtClean="0">
+                              <a:latin typeface="Cambria Math" panose="02040503050406030204" pitchFamily="18" charset="0"/>
+                            </a:rPr>
+                          </m:ctrlPr>
+                        </m:sSupPr>
+                        <m:e>
+                          <m:r>
+                            <a:rPr lang="en-US" b="0" i="1" smtClean="0">
+                              <a:latin typeface="Cambria Math" panose="02040503050406030204" pitchFamily="18" charset="0"/>
+                            </a:rPr>
+                            <m:t>𝐴</m:t>
+                          </m:r>
+                        </m:e>
+                        <m:sup>
+                          <m:r>
+                            <a:rPr lang="en-US" i="1">
+                              <a:latin typeface="Cambria Math" panose="02040503050406030204" pitchFamily="18" charset="0"/>
+                              <a:ea typeface="Cambria Math" panose="02040503050406030204" pitchFamily="18" charset="0"/>
+                            </a:rPr>
+                            <m:t>†</m:t>
+                          </m:r>
+                        </m:sup>
+                      </m:sSup>
+                    </m:oMath>
+                  </m:oMathPara>
+                </a14:m>
+                <a:endParaRPr lang="en-US"/>
+              </a:p>
+              <a:p>
+                <a:pPr marL="0" indent="0">
+                  <a:buNone/>
+                </a:pPr>
+                <a:endParaRPr lang="en-US"/>
+              </a:p>
+              <a:p>
+                <a:pPr marL="0" indent="0">
+                  <a:buNone/>
+                </a:pPr>
+                <a14:m>
+                  <m:oMathPara xmlns:m="http://schemas.openxmlformats.org/officeDocument/2006/math">
+                    <m:oMathParaPr>
+                      <m:jc m:val="centerGroup"/>
+                    </m:oMathParaPr>
+                    <m:oMath xmlns:m="http://schemas.openxmlformats.org/officeDocument/2006/math">
+                      <m:sSup>
+                        <m:sSupPr>
+                          <m:ctrlPr>
+                            <a:rPr lang="en-US" b="0" i="1" smtClean="0">
+                              <a:latin typeface="Cambria Math" panose="02040503050406030204" pitchFamily="18" charset="0"/>
+                            </a:rPr>
+                          </m:ctrlPr>
+                        </m:sSupPr>
+                        <m:e>
+                          <m:d>
+                            <m:dPr>
+                              <m:ctrlPr>
+                                <a:rPr lang="en-US" b="0" i="1" smtClean="0">
+                                  <a:latin typeface="Cambria Math" panose="02040503050406030204" pitchFamily="18" charset="0"/>
+                                </a:rPr>
+                              </m:ctrlPr>
+                            </m:dPr>
+                            <m:e>
+                              <m:r>
+                                <a:rPr lang="en-US" b="0" i="1" smtClean="0">
+                                  <a:latin typeface="Cambria Math" panose="02040503050406030204" pitchFamily="18" charset="0"/>
+                                </a:rPr>
+                                <m:t>𝐴</m:t>
+                              </m:r>
+                            </m:e>
+                            <m:e>
+                              <m:r>
+                                <a:rPr lang="en-US" b="0" i="1" smtClean="0">
+                                  <a:latin typeface="Cambria Math" panose="02040503050406030204" pitchFamily="18" charset="0"/>
+                                </a:rPr>
+                                <m:t>𝑣</m:t>
+                              </m:r>
+                              <m:r>
+                                <a:rPr lang="en-US" b="0" i="1" smtClean="0">
+                                  <a:latin typeface="Cambria Math" panose="02040503050406030204" pitchFamily="18" charset="0"/>
+                                </a:rPr>
+                                <m:t>⟩</m:t>
+                              </m:r>
+                            </m:e>
+                          </m:d>
+                        </m:e>
+                        <m:sup>
+                          <m:r>
+                            <a:rPr lang="en-US" i="1">
+                              <a:latin typeface="Cambria Math" panose="02040503050406030204" pitchFamily="18" charset="0"/>
+                              <a:ea typeface="Cambria Math" panose="02040503050406030204" pitchFamily="18" charset="0"/>
+                            </a:rPr>
+                            <m:t>†</m:t>
+                          </m:r>
+                        </m:sup>
+                      </m:sSup>
+                      <m:r>
+                        <a:rPr lang="en-US" b="0" i="1" smtClean="0">
+                          <a:latin typeface="Cambria Math" panose="02040503050406030204" pitchFamily="18" charset="0"/>
+                        </a:rPr>
+                        <m:t>=⟨</m:t>
+                      </m:r>
+                      <m:r>
+                        <a:rPr lang="en-US" b="0" i="1" smtClean="0">
+                          <a:latin typeface="Cambria Math" panose="02040503050406030204" pitchFamily="18" charset="0"/>
+                        </a:rPr>
+                        <m:t>𝑣</m:t>
+                      </m:r>
+                      <m:r>
+                        <a:rPr lang="en-US" b="0" i="1" smtClean="0">
+                          <a:latin typeface="Cambria Math" panose="02040503050406030204" pitchFamily="18" charset="0"/>
+                        </a:rPr>
+                        <m:t>|</m:t>
+                      </m:r>
+                      <m:sSup>
+                        <m:sSupPr>
+                          <m:ctrlPr>
+                            <a:rPr lang="en-US" b="0" i="1" smtClean="0">
+                              <a:latin typeface="Cambria Math" panose="02040503050406030204" pitchFamily="18" charset="0"/>
+                            </a:rPr>
+                          </m:ctrlPr>
+                        </m:sSupPr>
+                        <m:e>
+                          <m:r>
+                            <a:rPr lang="en-US" b="0" i="1" smtClean="0">
+                              <a:latin typeface="Cambria Math" panose="02040503050406030204" pitchFamily="18" charset="0"/>
+                            </a:rPr>
+                            <m:t>𝐴</m:t>
+                          </m:r>
+                        </m:e>
+                        <m:sup>
+                          <m:r>
+                            <a:rPr lang="en-US" i="1">
+                              <a:latin typeface="Cambria Math" panose="02040503050406030204" pitchFamily="18" charset="0"/>
+                              <a:ea typeface="Cambria Math" panose="02040503050406030204" pitchFamily="18" charset="0"/>
+                            </a:rPr>
+                            <m:t>†</m:t>
+                          </m:r>
+                        </m:sup>
+                      </m:sSup>
+                    </m:oMath>
+                  </m:oMathPara>
+                </a14:m>
+                <a:endParaRPr lang="en-US"/>
+              </a:p>
+              <a:p>
+                <a:pPr marL="0" indent="0">
+                  <a:buNone/>
+                </a:pPr>
+                <a:endParaRPr lang="en-US"/>
+              </a:p>
+              <a:p>
+                <a:pPr marL="0" indent="0">
+                  <a:buNone/>
+                </a:pPr>
+                <a14:m>
+                  <m:oMathPara xmlns:m="http://schemas.openxmlformats.org/officeDocument/2006/math">
+                    <m:oMathParaPr>
+                      <m:jc m:val="centerGroup"/>
+                    </m:oMathParaPr>
+                    <m:oMath xmlns:m="http://schemas.openxmlformats.org/officeDocument/2006/math">
+                      <m:d>
+                        <m:dPr>
+                          <m:ctrlPr>
+                            <a:rPr lang="en-US" b="0" i="1" smtClean="0">
+                              <a:latin typeface="Cambria Math" panose="02040503050406030204" pitchFamily="18" charset="0"/>
+                            </a:rPr>
+                          </m:ctrlPr>
+                        </m:dPr>
+                        <m:e>
+                          <m:d>
+                            <m:dPr>
+                              <m:begChr m:val="|"/>
+                              <m:endChr m:val="⟩"/>
+                              <m:ctrlPr>
+                                <a:rPr lang="en-US" b="0" i="1" smtClean="0">
+                                  <a:latin typeface="Cambria Math" panose="02040503050406030204" pitchFamily="18" charset="0"/>
+                                </a:rPr>
+                              </m:ctrlPr>
+                            </m:dPr>
+                            <m:e>
+                              <m:r>
+                                <a:rPr lang="en-US" b="0" i="1" smtClean="0">
+                                  <a:latin typeface="Cambria Math" panose="02040503050406030204" pitchFamily="18" charset="0"/>
+                                </a:rPr>
+                                <m:t>𝑣</m:t>
+                              </m:r>
+                            </m:e>
+                          </m:d>
+                          <m:r>
+                            <a:rPr lang="en-US" b="0" i="1" smtClean="0">
+                              <a:latin typeface="Cambria Math" panose="02040503050406030204" pitchFamily="18" charset="0"/>
+                            </a:rPr>
+                            <m:t>,</m:t>
+                          </m:r>
+                          <m:r>
+                            <a:rPr lang="en-US" b="0" i="1" smtClean="0">
+                              <a:latin typeface="Cambria Math" panose="02040503050406030204" pitchFamily="18" charset="0"/>
+                            </a:rPr>
+                            <m:t>𝐴</m:t>
+                          </m:r>
+                          <m:r>
+                            <a:rPr lang="en-US" b="0" i="1" smtClean="0">
+                              <a:latin typeface="Cambria Math" panose="02040503050406030204" pitchFamily="18" charset="0"/>
+                            </a:rPr>
+                            <m:t>|</m:t>
+                          </m:r>
+                          <m:r>
+                            <a:rPr lang="en-US" b="0" i="1" smtClean="0">
+                              <a:latin typeface="Cambria Math" panose="02040503050406030204" pitchFamily="18" charset="0"/>
+                            </a:rPr>
+                            <m:t>𝑤</m:t>
+                          </m:r>
+                          <m:r>
+                            <a:rPr lang="en-US" b="0" i="1" smtClean="0">
+                              <a:latin typeface="Cambria Math" panose="02040503050406030204" pitchFamily="18" charset="0"/>
+                            </a:rPr>
+                            <m:t>⟩</m:t>
+                          </m:r>
+                        </m:e>
+                      </m:d>
+                      <m:r>
+                        <a:rPr lang="en-US" b="0" i="1" smtClean="0">
+                          <a:latin typeface="Cambria Math" panose="02040503050406030204" pitchFamily="18" charset="0"/>
+                        </a:rPr>
+                        <m:t>=</m:t>
+                      </m:r>
+                      <m:d>
+                        <m:dPr>
+                          <m:ctrlPr>
+                            <a:rPr lang="en-US" b="0" i="1" smtClean="0">
+                              <a:latin typeface="Cambria Math" panose="02040503050406030204" pitchFamily="18" charset="0"/>
+                            </a:rPr>
+                          </m:ctrlPr>
+                        </m:dPr>
+                        <m:e>
+                          <m:sSup>
+                            <m:sSupPr>
+                              <m:ctrlPr>
+                                <a:rPr lang="en-US" b="0" i="1" smtClean="0">
+                                  <a:latin typeface="Cambria Math" panose="02040503050406030204" pitchFamily="18" charset="0"/>
+                                </a:rPr>
+                              </m:ctrlPr>
+                            </m:sSupPr>
+                            <m:e>
+                              <m:r>
+                                <a:rPr lang="en-US" b="0" i="1" smtClean="0">
+                                  <a:latin typeface="Cambria Math" panose="02040503050406030204" pitchFamily="18" charset="0"/>
+                                </a:rPr>
+                                <m:t>𝐴</m:t>
+                              </m:r>
+                            </m:e>
+                            <m:sup>
+                              <m:r>
+                                <a:rPr lang="en-US" i="1">
+                                  <a:latin typeface="Cambria Math" panose="02040503050406030204" pitchFamily="18" charset="0"/>
+                                  <a:ea typeface="Cambria Math" panose="02040503050406030204" pitchFamily="18" charset="0"/>
+                                </a:rPr>
+                                <m:t>†</m:t>
+                              </m:r>
+                            </m:sup>
+                          </m:sSup>
+                          <m:d>
+                            <m:dPr>
+                              <m:begChr m:val="|"/>
+                              <m:endChr m:val="⟩"/>
+                              <m:ctrlPr>
+                                <a:rPr lang="en-US" b="0" i="1" smtClean="0">
+                                  <a:latin typeface="Cambria Math" panose="02040503050406030204" pitchFamily="18" charset="0"/>
+                                </a:rPr>
+                              </m:ctrlPr>
+                            </m:dPr>
+                            <m:e>
+                              <m:r>
+                                <a:rPr lang="en-US" b="0" i="1" smtClean="0">
+                                  <a:latin typeface="Cambria Math" panose="02040503050406030204" pitchFamily="18" charset="0"/>
+                                </a:rPr>
+                                <m:t>𝑣</m:t>
+                              </m:r>
+                            </m:e>
+                          </m:d>
+                          <m:r>
+                            <a:rPr lang="en-US" b="0" i="1" smtClean="0">
+                              <a:latin typeface="Cambria Math" panose="02040503050406030204" pitchFamily="18" charset="0"/>
+                            </a:rPr>
+                            <m:t>,</m:t>
+                          </m:r>
+                          <m:d>
+                            <m:dPr>
+                              <m:begChr m:val="|"/>
+                              <m:endChr m:val="⟩"/>
+                              <m:ctrlPr>
+                                <a:rPr lang="en-US" b="0" i="1" smtClean="0">
+                                  <a:latin typeface="Cambria Math" panose="02040503050406030204" pitchFamily="18" charset="0"/>
+                                </a:rPr>
+                              </m:ctrlPr>
+                            </m:dPr>
+                            <m:e>
+                              <m:r>
+                                <a:rPr lang="en-US" b="0" i="1" smtClean="0">
+                                  <a:latin typeface="Cambria Math" panose="02040503050406030204" pitchFamily="18" charset="0"/>
+                                </a:rPr>
+                                <m:t>𝑤</m:t>
+                              </m:r>
+                            </m:e>
+                          </m:d>
+                        </m:e>
+                      </m:d>
+                    </m:oMath>
+                  </m:oMathPara>
+                </a14:m>
+                <a:endParaRPr lang="en-US"/>
+              </a:p>
+              <a:p>
+                <a:pPr marL="0" indent="0">
+                  <a:buNone/>
+                </a:pPr>
+                <a:endParaRPr lang="en-US"/>
+              </a:p>
+              <a:p>
+                <a:pPr marL="0" indent="0">
+                  <a:buNone/>
+                </a:pPr>
+                <a:r>
+                  <a:rPr lang="en-US"/>
+                  <a:t>Exercise 1.6.1: Prove that </a:t>
+                </a:r>
+                <a14:m>
+                  <m:oMath xmlns:m="http://schemas.openxmlformats.org/officeDocument/2006/math">
+                    <m:sSup>
+                      <m:sSupPr>
+                        <m:ctrlPr>
+                          <a:rPr lang="en-US" b="0" i="1" smtClean="0">
+                            <a:latin typeface="Cambria Math" panose="02040503050406030204" pitchFamily="18" charset="0"/>
+                          </a:rPr>
+                        </m:ctrlPr>
+                      </m:sSupPr>
+                      <m:e>
+                        <m:d>
+                          <m:dPr>
+                            <m:ctrlPr>
+                              <a:rPr lang="en-US" b="0" i="1" smtClean="0">
+                                <a:latin typeface="Cambria Math" panose="02040503050406030204" pitchFamily="18" charset="0"/>
+                              </a:rPr>
+                            </m:ctrlPr>
+                          </m:dPr>
+                          <m:e>
+                            <m:d>
+                              <m:dPr>
+                                <m:begChr m:val="|"/>
+                                <m:endChr m:val="⟩"/>
+                                <m:ctrlPr>
+                                  <a:rPr lang="en-US" b="0" i="1" smtClean="0">
+                                    <a:latin typeface="Cambria Math" panose="02040503050406030204" pitchFamily="18" charset="0"/>
+                                  </a:rPr>
+                                </m:ctrlPr>
+                              </m:dPr>
+                              <m:e>
+                                <m:r>
+                                  <a:rPr lang="en-US" b="0" i="1" smtClean="0">
+                                    <a:latin typeface="Cambria Math" panose="02040503050406030204" pitchFamily="18" charset="0"/>
+                                  </a:rPr>
+                                  <m:t>𝑤</m:t>
+                                </m:r>
+                              </m:e>
+                            </m:d>
+                            <m:d>
+                              <m:dPr>
+                                <m:begChr m:val="⟨"/>
+                                <m:endChr m:val="|"/>
+                                <m:ctrlPr>
+                                  <a:rPr lang="en-US" b="0" i="1" smtClean="0">
+                                    <a:latin typeface="Cambria Math" panose="02040503050406030204" pitchFamily="18" charset="0"/>
+                                  </a:rPr>
+                                </m:ctrlPr>
+                              </m:dPr>
+                              <m:e>
+                                <m:r>
+                                  <a:rPr lang="en-US" b="0" i="1" smtClean="0">
+                                    <a:latin typeface="Cambria Math" panose="02040503050406030204" pitchFamily="18" charset="0"/>
+                                  </a:rPr>
+                                  <m:t>𝑣</m:t>
+                                </m:r>
+                              </m:e>
+                            </m:d>
+                          </m:e>
+                        </m:d>
+                      </m:e>
+                      <m:sup>
+                        <m:r>
+                          <a:rPr lang="en-US" i="1">
+                            <a:latin typeface="Cambria Math" panose="02040503050406030204" pitchFamily="18" charset="0"/>
+                            <a:ea typeface="Cambria Math" panose="02040503050406030204" pitchFamily="18" charset="0"/>
+                          </a:rPr>
+                          <m:t>†</m:t>
+                        </m:r>
+                      </m:sup>
+                    </m:sSup>
+                    <m:r>
+                      <a:rPr lang="en-US" b="0" i="1" smtClean="0">
+                        <a:latin typeface="Cambria Math" panose="02040503050406030204" pitchFamily="18" charset="0"/>
+                      </a:rPr>
+                      <m:t>=</m:t>
+                    </m:r>
+                    <m:d>
+                      <m:dPr>
+                        <m:ctrlPr>
+                          <a:rPr lang="en-US" b="0" i="1" smtClean="0">
+                            <a:latin typeface="Cambria Math" panose="02040503050406030204" pitchFamily="18" charset="0"/>
+                          </a:rPr>
+                        </m:ctrlPr>
+                      </m:dPr>
+                      <m:e>
+                        <m:r>
+                          <a:rPr lang="en-US" b="0" i="1" smtClean="0">
+                            <a:latin typeface="Cambria Math" panose="02040503050406030204" pitchFamily="18" charset="0"/>
+                          </a:rPr>
+                          <m:t>|</m:t>
+                        </m:r>
+                        <m:r>
+                          <a:rPr lang="en-US" b="0" i="1" smtClean="0">
+                            <a:latin typeface="Cambria Math" panose="02040503050406030204" pitchFamily="18" charset="0"/>
+                          </a:rPr>
+                          <m:t>𝑣</m:t>
+                        </m:r>
+                        <m:r>
+                          <a:rPr lang="en-US" b="0" i="1" smtClean="0">
+                            <a:latin typeface="Cambria Math" panose="02040503050406030204" pitchFamily="18" charset="0"/>
+                          </a:rPr>
+                          <m:t>⟩⟨</m:t>
+                        </m:r>
+                        <m:r>
+                          <a:rPr lang="en-US" b="0" i="1" smtClean="0">
+                            <a:latin typeface="Cambria Math" panose="02040503050406030204" pitchFamily="18" charset="0"/>
+                          </a:rPr>
+                          <m:t>𝑤</m:t>
+                        </m:r>
+                        <m:r>
+                          <a:rPr lang="en-US" b="0" i="1" smtClean="0">
+                            <a:latin typeface="Cambria Math" panose="02040503050406030204" pitchFamily="18" charset="0"/>
+                          </a:rPr>
+                          <m:t>|</m:t>
+                        </m:r>
+                      </m:e>
+                    </m:d>
+                  </m:oMath>
+                </a14:m>
+                <a:endParaRPr lang="vi-VN"/>
+              </a:p>
+            </p:txBody>
+          </p:sp>
+        </mc:Choice>
+        <mc:Fallback>
+          <p:sp>
+            <p:nvSpPr>
+              <p:cNvPr id="3" name="Chỗ dành sẵn cho Nội dung 2">
+                <a:extLst>
+                  <a:ext uri="{FF2B5EF4-FFF2-40B4-BE49-F238E27FC236}">
+                    <a16:creationId xmlns:a16="http://schemas.microsoft.com/office/drawing/2014/main" id="{A65D444E-9B81-4B0B-8F3F-7B73B1202D78}"/>
+                  </a:ext>
+                </a:extLst>
+              </p:cNvPr>
+              <p:cNvSpPr>
+                <a:spLocks noGrp="1" noRot="1" noChangeAspect="1" noMove="1" noResize="1" noEditPoints="1" noAdjustHandles="1" noChangeArrowheads="1" noChangeShapeType="1" noTextEdit="1"/>
+              </p:cNvSpPr>
+              <p:nvPr>
+                <p:ph idx="1"/>
+              </p:nvPr>
+            </p:nvSpPr>
+            <p:spPr>
+              <a:blipFill>
+                <a:blip r:embed="rId2"/>
+                <a:stretch>
+                  <a:fillRect l="-1217" b="-2241"/>
+                </a:stretch>
+              </a:blipFill>
+            </p:spPr>
+            <p:txBody>
+              <a:bodyPr/>
+              <a:lstStyle/>
+              <a:p>
+                <a:r>
+                  <a:rPr lang="vi-VN">
+                    <a:noFill/>
+                  </a:rPr>
+                  <a:t> </a:t>
+                </a:r>
+              </a:p>
+            </p:txBody>
+          </p:sp>
+        </mc:Fallback>
+      </mc:AlternateContent>
+      <p:sp>
+        <p:nvSpPr>
+          <p:cNvPr id="4" name="Chỗ dành sẵn cho Số hiệu Bản chiếu 3">
+            <a:extLst>
+              <a:ext uri="{FF2B5EF4-FFF2-40B4-BE49-F238E27FC236}">
+                <a16:creationId xmlns:a16="http://schemas.microsoft.com/office/drawing/2014/main" id="{2987FF37-0E94-4117-802F-AF2BD05771FE}"/>
+              </a:ext>
+            </a:extLst>
+          </p:cNvPr>
+          <p:cNvSpPr>
+            <a:spLocks noGrp="1"/>
+          </p:cNvSpPr>
+          <p:nvPr>
+            <p:ph type="sldNum" sz="quarter" idx="12"/>
+          </p:nvPr>
+        </p:nvSpPr>
+        <p:spPr/>
+        <p:txBody>
+          <a:bodyPr/>
+          <a:lstStyle/>
+          <a:p>
+            <a:fld id="{92180ABF-BDB3-40CA-807F-6247C1C04879}" type="slidenum">
+              <a:rPr lang="vi-VN" smtClean="0"/>
+              <a:t>33</a:t>
+            </a:fld>
+            <a:endParaRPr lang="vi-VN"/>
+          </a:p>
+        </p:txBody>
+      </p:sp>
+    </p:spTree>
+    <p:extLst>
+      <p:ext uri="{BB962C8B-B14F-4D97-AF65-F5344CB8AC3E}">
+        <p14:creationId xmlns:p14="http://schemas.microsoft.com/office/powerpoint/2010/main" val="3623494303"/>
       </p:ext>
     </p:extLst>
   </p:cSld>
@@ -28438,7 +29228,19 @@
                       <a:rPr lang="en-US" b="0" i="1" smtClean="0">
                         <a:latin typeface="Cambria Math" panose="02040503050406030204" pitchFamily="18" charset="0"/>
                       </a:rPr>
-                      <m:t>=|0⟩</m:t>
+                      <m:t>=|</m:t>
+                    </m:r>
+                    <m:r>
+                      <a:rPr lang="en-US" b="0" i="1" smtClean="0">
+                        <a:latin typeface="Cambria Math" panose="02040503050406030204" pitchFamily="18" charset="0"/>
+                      </a:rPr>
+                      <m:t>0</m:t>
+                    </m:r>
+                    <m:r>
+                      <a:rPr lang="en-US" b="0" i="1" smtClean="0">
+                        <a:latin typeface="Cambria Math" panose="02040503050406030204" pitchFamily="18" charset="0"/>
+                      </a:rPr>
+                      <m:t>⟩</m:t>
                     </m:r>
                   </m:oMath>
                 </a14:m>
@@ -28553,7 +29355,19 @@
                       <a:rPr lang="en-US" b="0" i="1" smtClean="0">
                         <a:latin typeface="Cambria Math" panose="02040503050406030204" pitchFamily="18" charset="0"/>
                       </a:rPr>
-                      <m:t>=|1⟩</m:t>
+                      <m:t>=|</m:t>
+                    </m:r>
+                    <m:r>
+                      <a:rPr lang="en-US" b="0" i="1" smtClean="0">
+                        <a:latin typeface="Cambria Math" panose="02040503050406030204" pitchFamily="18" charset="0"/>
+                      </a:rPr>
+                      <m:t>1</m:t>
+                    </m:r>
+                    <m:r>
+                      <a:rPr lang="en-US" b="0" i="1" smtClean="0">
+                        <a:latin typeface="Cambria Math" panose="02040503050406030204" pitchFamily="18" charset="0"/>
+                      </a:rPr>
+                      <m:t>⟩</m:t>
                     </m:r>
                   </m:oMath>
                 </a14:m>

</xml_diff>